<commit_message>
Fixed CUDA rendering of voxelization.
Updated alpha presentation and readme with image.
Still defaulting to GL since its faster.
</commit_message>
<xml_diff>
--- a/presentations/alpha.pptx
+++ b/presentations/alpha.pptx
@@ -307,6 +307,7 @@
           <a:p>
             <a:fld id="{4EDDBFF4-C6D6-4933-8C55-43A349BA8E3F}" type="datetimeFigureOut">
               <a:rPr lang="en-US" smtClean="0"/>
+              <a:pPr/>
               <a:t>11/24/2014</a:t>
             </a:fld>
             <a:endParaRPr lang="en-US"/>
@@ -359,6 +360,7 @@
           <a:p>
             <a:fld id="{5550FA0B-CC57-447F-980A-16940DBAC844}" type="slidenum">
               <a:rPr lang="en-US" smtClean="0"/>
+              <a:pPr/>
               <a:t>‹#›</a:t>
             </a:fld>
             <a:endParaRPr lang="en-US"/>
@@ -660,6 +662,7 @@
           <a:p>
             <a:fld id="{4EDDBFF4-C6D6-4933-8C55-43A349BA8E3F}" type="datetimeFigureOut">
               <a:rPr lang="en-US" smtClean="0"/>
+              <a:pPr/>
               <a:t>11/24/2014</a:t>
             </a:fld>
             <a:endParaRPr lang="en-US"/>
@@ -702,6 +705,7 @@
           <a:p>
             <a:fld id="{5550FA0B-CC57-447F-980A-16940DBAC844}" type="slidenum">
               <a:rPr lang="en-US" smtClean="0"/>
+              <a:pPr/>
               <a:t>‹#›</a:t>
             </a:fld>
             <a:endParaRPr lang="en-US"/>
@@ -835,6 +839,7 @@
           <a:p>
             <a:fld id="{4EDDBFF4-C6D6-4933-8C55-43A349BA8E3F}" type="datetimeFigureOut">
               <a:rPr lang="en-US" smtClean="0"/>
+              <a:pPr/>
               <a:t>11/24/2014</a:t>
             </a:fld>
             <a:endParaRPr lang="en-US"/>
@@ -877,6 +882,7 @@
           <a:p>
             <a:fld id="{5550FA0B-CC57-447F-980A-16940DBAC844}" type="slidenum">
               <a:rPr lang="en-US" smtClean="0"/>
+              <a:pPr/>
               <a:t>‹#›</a:t>
             </a:fld>
             <a:endParaRPr lang="en-US"/>
@@ -948,6 +954,7 @@
           <a:p>
             <a:fld id="{4EDDBFF4-C6D6-4933-8C55-43A349BA8E3F}" type="datetimeFigureOut">
               <a:rPr lang="en-US" smtClean="0"/>
+              <a:pPr/>
               <a:t>11/24/2014</a:t>
             </a:fld>
             <a:endParaRPr lang="en-US"/>
@@ -990,6 +997,7 @@
           <a:p>
             <a:fld id="{5550FA0B-CC57-447F-980A-16940DBAC844}" type="slidenum">
               <a:rPr lang="en-US" smtClean="0"/>
+              <a:pPr/>
               <a:t>‹#›</a:t>
             </a:fld>
             <a:endParaRPr lang="en-US"/>
@@ -1306,6 +1314,7 @@
           <a:p>
             <a:fld id="{4EDDBFF4-C6D6-4933-8C55-43A349BA8E3F}" type="datetimeFigureOut">
               <a:rPr lang="en-US" smtClean="0"/>
+              <a:pPr/>
               <a:t>11/24/2014</a:t>
             </a:fld>
             <a:endParaRPr lang="en-US"/>
@@ -1500,6 +1509,7 @@
           <a:p>
             <a:fld id="{5550FA0B-CC57-447F-980A-16940DBAC844}" type="slidenum">
               <a:rPr lang="en-US" smtClean="0"/>
+              <a:pPr/>
               <a:t>‹#›</a:t>
             </a:fld>
             <a:endParaRPr lang="en-US"/>
@@ -1571,6 +1581,7 @@
           <a:p>
             <a:fld id="{4EDDBFF4-C6D6-4933-8C55-43A349BA8E3F}" type="datetimeFigureOut">
               <a:rPr lang="en-US" smtClean="0"/>
+              <a:pPr/>
               <a:t>11/24/2014</a:t>
             </a:fld>
             <a:endParaRPr lang="en-US"/>
@@ -1613,6 +1624,7 @@
           <a:p>
             <a:fld id="{5550FA0B-CC57-447F-980A-16940DBAC844}" type="slidenum">
               <a:rPr lang="en-US" smtClean="0"/>
+              <a:pPr/>
               <a:t>‹#›</a:t>
             </a:fld>
             <a:endParaRPr lang="en-US"/>
@@ -1933,6 +1945,7 @@
           <a:p>
             <a:fld id="{4EDDBFF4-C6D6-4933-8C55-43A349BA8E3F}" type="datetimeFigureOut">
               <a:rPr lang="en-US" smtClean="0"/>
+              <a:pPr/>
               <a:t>11/24/2014</a:t>
             </a:fld>
             <a:endParaRPr lang="en-US"/>
@@ -1975,6 +1988,7 @@
           <a:p>
             <a:fld id="{5550FA0B-CC57-447F-980A-16940DBAC844}" type="slidenum">
               <a:rPr lang="en-US" smtClean="0"/>
+              <a:pPr/>
               <a:t>‹#›</a:t>
             </a:fld>
             <a:endParaRPr lang="en-US"/>
@@ -2160,6 +2174,7 @@
           <a:p>
             <a:fld id="{4EDDBFF4-C6D6-4933-8C55-43A349BA8E3F}" type="datetimeFigureOut">
               <a:rPr lang="en-US" smtClean="0"/>
+              <a:pPr/>
               <a:t>11/24/2014</a:t>
             </a:fld>
             <a:endParaRPr lang="en-US"/>
@@ -2202,6 +2217,7 @@
           <a:p>
             <a:fld id="{5550FA0B-CC57-447F-980A-16940DBAC844}" type="slidenum">
               <a:rPr lang="en-US" smtClean="0"/>
+              <a:pPr/>
               <a:t>‹#›</a:t>
             </a:fld>
             <a:endParaRPr lang="en-US"/>
@@ -2250,6 +2266,7 @@
           <a:p>
             <a:fld id="{4EDDBFF4-C6D6-4933-8C55-43A349BA8E3F}" type="datetimeFigureOut">
               <a:rPr lang="en-US" smtClean="0"/>
+              <a:pPr/>
               <a:t>11/24/2014</a:t>
             </a:fld>
             <a:endParaRPr lang="en-US"/>
@@ -2292,6 +2309,7 @@
           <a:p>
             <a:fld id="{5550FA0B-CC57-447F-980A-16940DBAC844}" type="slidenum">
               <a:rPr lang="en-US" smtClean="0"/>
+              <a:pPr/>
               <a:t>‹#›</a:t>
             </a:fld>
             <a:endParaRPr lang="en-US"/>
@@ -2517,6 +2535,7 @@
           <a:p>
             <a:fld id="{4EDDBFF4-C6D6-4933-8C55-43A349BA8E3F}" type="datetimeFigureOut">
               <a:rPr lang="en-US" smtClean="0"/>
+              <a:pPr/>
               <a:t>11/24/2014</a:t>
             </a:fld>
             <a:endParaRPr lang="en-US"/>
@@ -2559,6 +2578,7 @@
           <a:p>
             <a:fld id="{5550FA0B-CC57-447F-980A-16940DBAC844}" type="slidenum">
               <a:rPr lang="en-US" smtClean="0"/>
+              <a:pPr/>
               <a:t>‹#›</a:t>
             </a:fld>
             <a:endParaRPr lang="en-US"/>
@@ -2745,6 +2765,7 @@
           <a:p>
             <a:fld id="{4EDDBFF4-C6D6-4933-8C55-43A349BA8E3F}" type="datetimeFigureOut">
               <a:rPr lang="en-US" smtClean="0"/>
+              <a:pPr/>
               <a:t>11/24/2014</a:t>
             </a:fld>
             <a:endParaRPr lang="en-US"/>
@@ -2797,6 +2818,7 @@
           <a:p>
             <a:fld id="{5550FA0B-CC57-447F-980A-16940DBAC844}" type="slidenum">
               <a:rPr lang="en-US" smtClean="0"/>
+              <a:pPr/>
               <a:t>‹#›</a:t>
             </a:fld>
             <a:endParaRPr lang="en-US"/>
@@ -3244,6 +3266,7 @@
           <a:p>
             <a:fld id="{4EDDBFF4-C6D6-4933-8C55-43A349BA8E3F}" type="datetimeFigureOut">
               <a:rPr lang="en-US" smtClean="0"/>
+              <a:pPr/>
               <a:t>11/24/2014</a:t>
             </a:fld>
             <a:endParaRPr lang="en-US"/>
@@ -3326,6 +3349,7 @@
           <a:p>
             <a:fld id="{5550FA0B-CC57-447F-980A-16940DBAC844}" type="slidenum">
               <a:rPr lang="en-US" smtClean="0"/>
+              <a:pPr/>
               <a:t>‹#›</a:t>
             </a:fld>
             <a:endParaRPr lang="en-US"/>
@@ -4415,7 +4439,7 @@
         </p:blipFill>
         <p:spPr bwMode="auto">
           <a:xfrm>
-            <a:off x="5181600" y="1676400"/>
+            <a:off x="228600" y="1447800"/>
             <a:ext cx="3537917" cy="2655888"/>
           </a:xfrm>
           <a:prstGeom prst="rect">
@@ -4441,8 +4465,8 @@
         </p:blipFill>
         <p:spPr bwMode="auto">
           <a:xfrm>
-            <a:off x="228600" y="1371600"/>
-            <a:ext cx="2971800" cy="3037840"/>
+            <a:off x="4343400" y="1447800"/>
+            <a:ext cx="2822713" cy="2885440"/>
           </a:xfrm>
           <a:prstGeom prst="rect">
             <a:avLst/>
@@ -4467,8 +4491,34 @@
         </p:blipFill>
         <p:spPr bwMode="auto">
           <a:xfrm>
-            <a:off x="2667000" y="3581400"/>
-            <a:ext cx="2986958" cy="2973340"/>
+            <a:off x="1828800" y="4038600"/>
+            <a:ext cx="2604213" cy="2592340"/>
+          </a:xfrm>
+          <a:prstGeom prst="rect">
+            <a:avLst/>
+          </a:prstGeom>
+          <a:noFill/>
+        </p:spPr>
+      </p:pic>
+      <p:pic>
+        <p:nvPicPr>
+          <p:cNvPr id="2" name="Picture 2" descr="C:\Users\Dave\Documents\GitHub\Voxel-based-Rendering-\images\stanford_dragon_voxelized_cuda.png"/>
+          <p:cNvPicPr>
+            <a:picLocks noChangeAspect="1" noChangeArrowheads="1"/>
+          </p:cNvPicPr>
+          <p:nvPr/>
+        </p:nvPicPr>
+        <p:blipFill>
+          <a:blip r:embed="rId5" cstate="print"/>
+          <a:srcRect/>
+          <a:stretch>
+            <a:fillRect/>
+          </a:stretch>
+        </p:blipFill>
+        <p:spPr bwMode="auto">
+          <a:xfrm>
+            <a:off x="5638800" y="3352800"/>
+            <a:ext cx="3228975" cy="3284171"/>
           </a:xfrm>
           <a:prstGeom prst="rect">
             <a:avLst/>

</xml_diff>